<commit_message>
Session 1 - Slide setup & clean-up
</commit_message>
<xml_diff>
--- a/slides/img/session-01/dbd_pillars.pptx
+++ b/slides/img/session-01/dbd_pillars.pptx
@@ -246,7 +246,7 @@
           <a:p>
             <a:fld id="{D4AD81DB-2089-4255-B6DA-736AFDF018C6}" type="datetimeFigureOut">
               <a:rPr lang="de-DE" smtClean="0"/>
-              <a:t>25.10.2022</a:t>
+              <a:t>20.10.23</a:t>
             </a:fld>
             <a:endParaRPr lang="de-DE"/>
           </a:p>
@@ -288,7 +288,7 @@
           <a:p>
             <a:fld id="{9EC1B75E-8BEB-4672-8622-B45B40C286ED}" type="slidenum">
               <a:rPr lang="de-DE" smtClean="0"/>
-              <a:t>‹#›</a:t>
+              <a:t>‹Nr.›</a:t>
             </a:fld>
             <a:endParaRPr lang="de-DE"/>
           </a:p>
@@ -416,7 +416,7 @@
           <a:p>
             <a:fld id="{D4AD81DB-2089-4255-B6DA-736AFDF018C6}" type="datetimeFigureOut">
               <a:rPr lang="de-DE" smtClean="0"/>
-              <a:t>25.10.2022</a:t>
+              <a:t>20.10.23</a:t>
             </a:fld>
             <a:endParaRPr lang="de-DE"/>
           </a:p>
@@ -458,7 +458,7 @@
           <a:p>
             <a:fld id="{9EC1B75E-8BEB-4672-8622-B45B40C286ED}" type="slidenum">
               <a:rPr lang="de-DE" smtClean="0"/>
-              <a:t>‹#›</a:t>
+              <a:t>‹Nr.›</a:t>
             </a:fld>
             <a:endParaRPr lang="de-DE"/>
           </a:p>
@@ -596,7 +596,7 @@
           <a:p>
             <a:fld id="{D4AD81DB-2089-4255-B6DA-736AFDF018C6}" type="datetimeFigureOut">
               <a:rPr lang="de-DE" smtClean="0"/>
-              <a:t>25.10.2022</a:t>
+              <a:t>20.10.23</a:t>
             </a:fld>
             <a:endParaRPr lang="de-DE"/>
           </a:p>
@@ -638,7 +638,7 @@
           <a:p>
             <a:fld id="{9EC1B75E-8BEB-4672-8622-B45B40C286ED}" type="slidenum">
               <a:rPr lang="de-DE" smtClean="0"/>
-              <a:t>‹#›</a:t>
+              <a:t>‹Nr.›</a:t>
             </a:fld>
             <a:endParaRPr lang="de-DE"/>
           </a:p>
@@ -766,7 +766,7 @@
           <a:p>
             <a:fld id="{D4AD81DB-2089-4255-B6DA-736AFDF018C6}" type="datetimeFigureOut">
               <a:rPr lang="de-DE" smtClean="0"/>
-              <a:t>25.10.2022</a:t>
+              <a:t>20.10.23</a:t>
             </a:fld>
             <a:endParaRPr lang="de-DE"/>
           </a:p>
@@ -808,7 +808,7 @@
           <a:p>
             <a:fld id="{9EC1B75E-8BEB-4672-8622-B45B40C286ED}" type="slidenum">
               <a:rPr lang="de-DE" smtClean="0"/>
-              <a:t>‹#›</a:t>
+              <a:t>‹Nr.›</a:t>
             </a:fld>
             <a:endParaRPr lang="de-DE"/>
           </a:p>
@@ -1010,7 +1010,7 @@
           <a:p>
             <a:fld id="{D4AD81DB-2089-4255-B6DA-736AFDF018C6}" type="datetimeFigureOut">
               <a:rPr lang="de-DE" smtClean="0"/>
-              <a:t>25.10.2022</a:t>
+              <a:t>20.10.23</a:t>
             </a:fld>
             <a:endParaRPr lang="de-DE"/>
           </a:p>
@@ -1052,7 +1052,7 @@
           <a:p>
             <a:fld id="{9EC1B75E-8BEB-4672-8622-B45B40C286ED}" type="slidenum">
               <a:rPr lang="de-DE" smtClean="0"/>
-              <a:t>‹#›</a:t>
+              <a:t>‹Nr.›</a:t>
             </a:fld>
             <a:endParaRPr lang="de-DE"/>
           </a:p>
@@ -1242,7 +1242,7 @@
           <a:p>
             <a:fld id="{D4AD81DB-2089-4255-B6DA-736AFDF018C6}" type="datetimeFigureOut">
               <a:rPr lang="de-DE" smtClean="0"/>
-              <a:t>25.10.2022</a:t>
+              <a:t>20.10.23</a:t>
             </a:fld>
             <a:endParaRPr lang="de-DE"/>
           </a:p>
@@ -1284,7 +1284,7 @@
           <a:p>
             <a:fld id="{9EC1B75E-8BEB-4672-8622-B45B40C286ED}" type="slidenum">
               <a:rPr lang="de-DE" smtClean="0"/>
-              <a:t>‹#›</a:t>
+              <a:t>‹Nr.›</a:t>
             </a:fld>
             <a:endParaRPr lang="de-DE"/>
           </a:p>
@@ -1609,7 +1609,7 @@
           <a:p>
             <a:fld id="{D4AD81DB-2089-4255-B6DA-736AFDF018C6}" type="datetimeFigureOut">
               <a:rPr lang="de-DE" smtClean="0"/>
-              <a:t>25.10.2022</a:t>
+              <a:t>20.10.23</a:t>
             </a:fld>
             <a:endParaRPr lang="de-DE"/>
           </a:p>
@@ -1651,7 +1651,7 @@
           <a:p>
             <a:fld id="{9EC1B75E-8BEB-4672-8622-B45B40C286ED}" type="slidenum">
               <a:rPr lang="de-DE" smtClean="0"/>
-              <a:t>‹#›</a:t>
+              <a:t>‹Nr.›</a:t>
             </a:fld>
             <a:endParaRPr lang="de-DE"/>
           </a:p>
@@ -1727,7 +1727,7 @@
           <a:p>
             <a:fld id="{D4AD81DB-2089-4255-B6DA-736AFDF018C6}" type="datetimeFigureOut">
               <a:rPr lang="de-DE" smtClean="0"/>
-              <a:t>25.10.2022</a:t>
+              <a:t>20.10.23</a:t>
             </a:fld>
             <a:endParaRPr lang="de-DE"/>
           </a:p>
@@ -1769,7 +1769,7 @@
           <a:p>
             <a:fld id="{9EC1B75E-8BEB-4672-8622-B45B40C286ED}" type="slidenum">
               <a:rPr lang="de-DE" smtClean="0"/>
-              <a:t>‹#›</a:t>
+              <a:t>‹Nr.›</a:t>
             </a:fld>
             <a:endParaRPr lang="de-DE"/>
           </a:p>
@@ -1822,7 +1822,7 @@
           <a:p>
             <a:fld id="{D4AD81DB-2089-4255-B6DA-736AFDF018C6}" type="datetimeFigureOut">
               <a:rPr lang="de-DE" smtClean="0"/>
-              <a:t>25.10.2022</a:t>
+              <a:t>20.10.23</a:t>
             </a:fld>
             <a:endParaRPr lang="de-DE"/>
           </a:p>
@@ -1864,7 +1864,7 @@
           <a:p>
             <a:fld id="{9EC1B75E-8BEB-4672-8622-B45B40C286ED}" type="slidenum">
               <a:rPr lang="de-DE" smtClean="0"/>
-              <a:t>‹#›</a:t>
+              <a:t>‹Nr.›</a:t>
             </a:fld>
             <a:endParaRPr lang="de-DE"/>
           </a:p>
@@ -2099,7 +2099,7 @@
           <a:p>
             <a:fld id="{D4AD81DB-2089-4255-B6DA-736AFDF018C6}" type="datetimeFigureOut">
               <a:rPr lang="de-DE" smtClean="0"/>
-              <a:t>25.10.2022</a:t>
+              <a:t>20.10.23</a:t>
             </a:fld>
             <a:endParaRPr lang="de-DE"/>
           </a:p>
@@ -2141,7 +2141,7 @@
           <a:p>
             <a:fld id="{9EC1B75E-8BEB-4672-8622-B45B40C286ED}" type="slidenum">
               <a:rPr lang="de-DE" smtClean="0"/>
-              <a:t>‹#›</a:t>
+              <a:t>‹Nr.›</a:t>
             </a:fld>
             <a:endParaRPr lang="de-DE"/>
           </a:p>
@@ -2356,7 +2356,7 @@
           <a:p>
             <a:fld id="{D4AD81DB-2089-4255-B6DA-736AFDF018C6}" type="datetimeFigureOut">
               <a:rPr lang="de-DE" smtClean="0"/>
-              <a:t>25.10.2022</a:t>
+              <a:t>20.10.23</a:t>
             </a:fld>
             <a:endParaRPr lang="de-DE"/>
           </a:p>
@@ -2398,7 +2398,7 @@
           <a:p>
             <a:fld id="{9EC1B75E-8BEB-4672-8622-B45B40C286ED}" type="slidenum">
               <a:rPr lang="de-DE" smtClean="0"/>
-              <a:t>‹#›</a:t>
+              <a:t>‹Nr.›</a:t>
             </a:fld>
             <a:endParaRPr lang="de-DE"/>
           </a:p>
@@ -2569,7 +2569,7 @@
           <a:p>
             <a:fld id="{D4AD81DB-2089-4255-B6DA-736AFDF018C6}" type="datetimeFigureOut">
               <a:rPr lang="de-DE" smtClean="0"/>
-              <a:t>25.10.2022</a:t>
+              <a:t>20.10.23</a:t>
             </a:fld>
             <a:endParaRPr lang="de-DE"/>
           </a:p>
@@ -2647,7 +2647,7 @@
           <a:p>
             <a:fld id="{9EC1B75E-8BEB-4672-8622-B45B40C286ED}" type="slidenum">
               <a:rPr lang="de-DE" smtClean="0"/>
-              <a:t>‹#›</a:t>
+              <a:t>‹Nr.›</a:t>
             </a:fld>
             <a:endParaRPr lang="de-DE"/>
           </a:p>
@@ -5776,7 +5776,7 @@
             <a:avLst/>
           </a:prstGeom>
           <a:solidFill>
-            <a:srgbClr val="E6002E"/>
+            <a:srgbClr val="C50F3C"/>
           </a:solidFill>
           <a:ln w="28575">
             <a:noFill/>
@@ -6000,7 +6000,7 @@
           </a:solidFill>
           <a:ln>
             <a:solidFill>
-              <a:srgbClr val="04316A"/>
+              <a:srgbClr val="C50F3C"/>
             </a:solidFill>
           </a:ln>
         </p:spPr>
@@ -6028,7 +6028,7 @@
             <a:r>
               <a:rPr lang="de-DE" sz="2800" cap="small" dirty="0">
                 <a:solidFill>
-                  <a:srgbClr val="04316A"/>
+                  <a:srgbClr val="C50F3C"/>
                 </a:solidFill>
                 <a:latin typeface="Corbel" panose="020B0503020204020204" pitchFamily="34" charset="0"/>
               </a:rPr>
@@ -6062,7 +6062,7 @@
           </a:solidFill>
           <a:ln>
             <a:solidFill>
-              <a:srgbClr val="04316A"/>
+              <a:srgbClr val="C50F3C"/>
             </a:solidFill>
           </a:ln>
         </p:spPr>
@@ -6090,7 +6090,7 @@
             <a:r>
               <a:rPr lang="de-DE" sz="2800" cap="small" dirty="0">
                 <a:solidFill>
-                  <a:srgbClr val="04316A"/>
+                  <a:srgbClr val="C50F3C"/>
                 </a:solidFill>
                 <a:latin typeface="Corbel" panose="020B0503020204020204" pitchFamily="34" charset="0"/>
               </a:rPr>

</xml_diff>